<commit_message>
source code with english comments
</commit_message>
<xml_diff>
--- a/hand_recognition_eloadas.pptx
+++ b/hand_recognition_eloadas.pptx
@@ -6,16 +6,17 @@
   </p:sldMasterIdLst>
   <p:sldIdLst>
     <p:sldId id="256" r:id="rId2"/>
-    <p:sldId id="257" r:id="rId3"/>
-    <p:sldId id="258" r:id="rId4"/>
-    <p:sldId id="259" r:id="rId5"/>
-    <p:sldId id="260" r:id="rId6"/>
-    <p:sldId id="261" r:id="rId7"/>
-    <p:sldId id="262" r:id="rId8"/>
-    <p:sldId id="263" r:id="rId9"/>
-    <p:sldId id="264" r:id="rId10"/>
-    <p:sldId id="266" r:id="rId11"/>
-    <p:sldId id="265" r:id="rId12"/>
+    <p:sldId id="267" r:id="rId3"/>
+    <p:sldId id="257" r:id="rId4"/>
+    <p:sldId id="258" r:id="rId5"/>
+    <p:sldId id="259" r:id="rId6"/>
+    <p:sldId id="260" r:id="rId7"/>
+    <p:sldId id="261" r:id="rId8"/>
+    <p:sldId id="262" r:id="rId9"/>
+    <p:sldId id="263" r:id="rId10"/>
+    <p:sldId id="264" r:id="rId11"/>
+    <p:sldId id="266" r:id="rId12"/>
+    <p:sldId id="265" r:id="rId13"/>
   </p:sldIdLst>
   <p:sldSz cx="12192000" cy="6858000"/>
   <p:notesSz cx="6858000" cy="9144000"/>
@@ -217,7 +218,7 @@
           <a:effectLst/>
           <a:extLst>
             <a:ext uri="{91240B29-F687-4f45-9708-019B960494DF}">
-              <a14:hiddenLine xmlns:a14="http://schemas.microsoft.com/office/drawing/2010/main" xmlns="" w="9525">
+              <a14:hiddenLine xmlns="" xmlns:a14="http://schemas.microsoft.com/office/drawing/2010/main" w="9525">
                 <a:solidFill>
                   <a:srgbClr val="000000"/>
                 </a:solidFill>
@@ -410,7 +411,7 @@
             <a:fld id="{08B9EBBA-996F-894A-B54A-D6246ED52CEA}" type="datetimeFigureOut">
               <a:rPr lang="en-US" dirty="0"/>
               <a:pPr/>
-              <a:t>4/3/2016</a:t>
+              <a:t>4/4/2016</a:t>
             </a:fld>
             <a:endParaRPr lang="en-US" dirty="0"/>
           </a:p>
@@ -725,7 +726,7 @@
             <a:fld id="{18C79C5D-2A6F-F04D-97DA-BEF2467B64E4}" type="datetimeFigureOut">
               <a:rPr lang="en-US" dirty="0"/>
               <a:pPr/>
-              <a:t>4/3/2016</a:t>
+              <a:t>4/4/2016</a:t>
             </a:fld>
             <a:endParaRPr lang="en-US" dirty="0"/>
           </a:p>
@@ -1210,7 +1211,7 @@
             <a:fld id="{8DFA1846-DA80-1C48-A609-854EA85C59AD}" type="datetimeFigureOut">
               <a:rPr lang="en-US" dirty="0"/>
               <a:pPr/>
-              <a:t>4/3/2016</a:t>
+              <a:t>4/4/2016</a:t>
             </a:fld>
             <a:endParaRPr lang="en-US" dirty="0"/>
           </a:p>
@@ -1576,7 +1577,7 @@
             <a:fld id="{FBF54567-0DE4-3F47-BF90-CB84690072F9}" type="datetimeFigureOut">
               <a:rPr lang="en-US" dirty="0"/>
               <a:pPr/>
-              <a:t>4/3/2016</a:t>
+              <a:t>4/4/2016</a:t>
             </a:fld>
             <a:endParaRPr lang="en-US" dirty="0"/>
           </a:p>
@@ -1727,7 +1728,7 @@
           <a:ln/>
           <a:extLst>
             <a:ext uri="{91240B29-F687-4f45-9708-019B960494DF}">
-              <a14:hiddenLine xmlns:a14="http://schemas.microsoft.com/office/drawing/2010/main" xmlns="" w="9525">
+              <a14:hiddenLine xmlns="" xmlns:a14="http://schemas.microsoft.com/office/drawing/2010/main" w="9525">
                 <a:solidFill>
                   <a:srgbClr val="000000"/>
                 </a:solidFill>
@@ -1846,7 +1847,7 @@
             <a:fld id="{C6C52C72-DE31-F449-A4ED-4C594FD91407}" type="datetimeFigureOut">
               <a:rPr lang="en-US" dirty="0"/>
               <a:pPr/>
-              <a:t>4/3/2016</a:t>
+              <a:t>4/4/2016</a:t>
             </a:fld>
             <a:endParaRPr lang="en-US" dirty="0"/>
           </a:p>
@@ -1999,7 +2000,7 @@
           <a:ln/>
           <a:extLst>
             <a:ext uri="{91240B29-F687-4f45-9708-019B960494DF}">
-              <a14:hiddenLine xmlns:a14="http://schemas.microsoft.com/office/drawing/2010/main" xmlns="" w="9525">
+              <a14:hiddenLine xmlns="" xmlns:a14="http://schemas.microsoft.com/office/drawing/2010/main" w="9525">
                 <a:solidFill>
                   <a:srgbClr val="000000"/>
                 </a:solidFill>
@@ -2128,7 +2129,7 @@
             <a:fld id="{ED62726E-379B-B349-9EED-81ED093FA806}" type="datetimeFigureOut">
               <a:rPr lang="en-US" dirty="0"/>
               <a:pPr/>
-              <a:t>4/3/2016</a:t>
+              <a:t>4/4/2016</a:t>
             </a:fld>
             <a:endParaRPr lang="en-US" dirty="0"/>
           </a:p>
@@ -2279,7 +2280,7 @@
           <a:ln/>
           <a:extLst>
             <a:ext uri="{91240B29-F687-4f45-9708-019B960494DF}">
-              <a14:hiddenLine xmlns:a14="http://schemas.microsoft.com/office/drawing/2010/main" xmlns="" w="9525">
+              <a14:hiddenLine xmlns="" xmlns:a14="http://schemas.microsoft.com/office/drawing/2010/main" w="9525">
                 <a:solidFill>
                   <a:srgbClr val="000000"/>
                 </a:solidFill>
@@ -2408,7 +2409,7 @@
             <a:fld id="{9B3A1323-8D79-1946-B0D7-40001CF92E9D}" type="datetimeFigureOut">
               <a:rPr lang="en-US" dirty="0"/>
               <a:pPr/>
-              <a:t>4/3/2016</a:t>
+              <a:t>4/4/2016</a:t>
             </a:fld>
             <a:endParaRPr lang="en-US" dirty="0"/>
           </a:p>
@@ -2748,7 +2749,7 @@
             <a:fld id="{8DFA1846-DA80-1C48-A609-854EA85C59AD}" type="datetimeFigureOut">
               <a:rPr lang="en-US" dirty="0"/>
               <a:pPr/>
-              <a:t>4/3/2016</a:t>
+              <a:t>4/4/2016</a:t>
             </a:fld>
             <a:endParaRPr lang="en-US" dirty="0"/>
           </a:p>
@@ -2899,7 +2900,7 @@
           <a:ln/>
           <a:extLst>
             <a:ext uri="{91240B29-F687-4f45-9708-019B960494DF}">
-              <a14:hiddenLine xmlns:a14="http://schemas.microsoft.com/office/drawing/2010/main" xmlns="" w="9525">
+              <a14:hiddenLine xmlns="" xmlns:a14="http://schemas.microsoft.com/office/drawing/2010/main" w="9525">
                 <a:solidFill>
                   <a:srgbClr val="000000"/>
                 </a:solidFill>
@@ -3084,7 +3085,7 @@
             <a:fld id="{57302355-E14B-8545-A8F8-0FE83CC9D524}" type="datetimeFigureOut">
               <a:rPr lang="en-US" dirty="0"/>
               <a:pPr/>
-              <a:t>4/3/2016</a:t>
+              <a:t>4/4/2016</a:t>
             </a:fld>
             <a:endParaRPr lang="en-US" dirty="0"/>
           </a:p>
@@ -3235,7 +3236,7 @@
           <a:ln/>
           <a:extLst>
             <a:ext uri="{91240B29-F687-4f45-9708-019B960494DF}">
-              <a14:hiddenLine xmlns:a14="http://schemas.microsoft.com/office/drawing/2010/main" xmlns="" w="9525">
+              <a14:hiddenLine xmlns="" xmlns:a14="http://schemas.microsoft.com/office/drawing/2010/main" w="9525">
                 <a:solidFill>
                   <a:srgbClr val="000000"/>
                 </a:solidFill>
@@ -3558,7 +3559,7 @@
             <a:fld id="{02640F58-564D-2B4F-AE67-E407BA4FCF45}" type="datetimeFigureOut">
               <a:rPr lang="en-US" dirty="0"/>
               <a:pPr/>
-              <a:t>4/3/2016</a:t>
+              <a:t>4/4/2016</a:t>
             </a:fld>
             <a:endParaRPr lang="en-US" dirty="0"/>
           </a:p>
@@ -3709,7 +3710,7 @@
           <a:ln/>
           <a:extLst>
             <a:ext uri="{91240B29-F687-4f45-9708-019B960494DF}">
-              <a14:hiddenLine xmlns:a14="http://schemas.microsoft.com/office/drawing/2010/main" xmlns="" w="9525">
+              <a14:hiddenLine xmlns="" xmlns:a14="http://schemas.microsoft.com/office/drawing/2010/main" w="9525">
                 <a:solidFill>
                   <a:srgbClr val="000000"/>
                 </a:solidFill>
@@ -3776,7 +3777,7 @@
             <a:fld id="{F13A34C8-038E-2045-AF43-DF7DBB8E0E9E}" type="datetimeFigureOut">
               <a:rPr lang="en-US" dirty="0"/>
               <a:pPr/>
-              <a:t>4/3/2016</a:t>
+              <a:t>4/4/2016</a:t>
             </a:fld>
             <a:endParaRPr lang="en-US" dirty="0"/>
           </a:p>
@@ -3868,7 +3869,7 @@
             <a:fld id="{8818C68F-D26B-8F47-958C-23B49CF8A634}" type="datetimeFigureOut">
               <a:rPr lang="en-US" dirty="0"/>
               <a:pPr/>
-              <a:t>4/3/2016</a:t>
+              <a:t>4/4/2016</a:t>
             </a:fld>
             <a:endParaRPr lang="en-US" dirty="0"/>
           </a:p>
@@ -4132,7 +4133,7 @@
           <a:ln/>
           <a:extLst>
             <a:ext uri="{91240B29-F687-4f45-9708-019B960494DF}">
-              <a14:hiddenLine xmlns:a14="http://schemas.microsoft.com/office/drawing/2010/main" xmlns="" w="9525">
+              <a14:hiddenLine xmlns="" xmlns:a14="http://schemas.microsoft.com/office/drawing/2010/main" w="9525">
                 <a:solidFill>
                   <a:srgbClr val="000000"/>
                 </a:solidFill>
@@ -4332,7 +4333,7 @@
             <a:fld id="{D0DF5E60-9974-AC48-9591-99C2BB44B7CF}" type="datetimeFigureOut">
               <a:rPr lang="en-US" dirty="0"/>
               <a:pPr/>
-              <a:t>4/3/2016</a:t>
+              <a:t>4/4/2016</a:t>
             </a:fld>
             <a:endParaRPr lang="en-US" dirty="0"/>
           </a:p>
@@ -4642,7 +4643,7 @@
             <a:fld id="{18C79C5D-2A6F-F04D-97DA-BEF2467B64E4}" type="datetimeFigureOut">
               <a:rPr lang="en-US" dirty="0"/>
               <a:pPr/>
-              <a:t>4/3/2016</a:t>
+              <a:t>4/4/2016</a:t>
             </a:fld>
             <a:endParaRPr lang="en-US" dirty="0"/>
           </a:p>
@@ -4909,7 +4910,7 @@
             <a:fld id="{09B482E8-6E0E-1B4F-B1FD-C69DB9E858D9}" type="datetimeFigureOut">
               <a:rPr lang="en-US" dirty="0"/>
               <a:pPr/>
-              <a:t>4/3/2016</a:t>
+              <a:t>4/4/2016</a:t>
             </a:fld>
             <a:endParaRPr lang="en-US" dirty="0"/>
           </a:p>
@@ -5365,7 +5366,12 @@
             <p:ph type="ctrTitle"/>
           </p:nvPr>
         </p:nvSpPr>
-        <p:spPr/>
+        <p:spPr>
+          <a:xfrm>
+            <a:off x="810001" y="1468192"/>
+            <a:ext cx="10572000" cy="2952006"/>
+          </a:xfrm>
+        </p:spPr>
         <p:txBody>
           <a:bodyPr/>
           <a:lstStyle/>
@@ -5388,9 +5394,16 @@
             <p:ph type="subTitle" idx="1"/>
           </p:nvPr>
         </p:nvSpPr>
-        <p:spPr/>
-        <p:txBody>
-          <a:bodyPr/>
+        <p:spPr>
+          <a:xfrm>
+            <a:off x="810001" y="5280847"/>
+            <a:ext cx="10572000" cy="566161"/>
+          </a:xfrm>
+        </p:spPr>
+        <p:txBody>
+          <a:bodyPr>
+            <a:normAutofit/>
+          </a:bodyPr>
           <a:lstStyle/>
           <a:p>
             <a:r>
@@ -5403,9 +5416,13 @@
             </a:r>
             <a:r>
               <a:rPr lang="hu-HU" dirty="0" smtClean="0"/>
-              <a:t> probléma</a:t>
-            </a:r>
-            <a:endParaRPr lang="hu-HU" dirty="0"/>
+              <a:t> </a:t>
+            </a:r>
+            <a:r>
+              <a:rPr lang="hu-HU" dirty="0" smtClean="0"/>
+              <a:t>probléma</a:t>
+            </a:r>
+            <a:endParaRPr lang="en-US" dirty="0" smtClean="0"/>
           </a:p>
         </p:txBody>
       </p:sp>
@@ -5462,6 +5479,278 @@
           <a:lstStyle/>
           <a:p>
             <a:r>
+              <a:rPr lang="hu-HU" dirty="0"/>
+              <a:t>Ujjak felismerése</a:t>
+            </a:r>
+          </a:p>
+        </p:txBody>
+      </p:sp>
+      <p:pic>
+        <p:nvPicPr>
+          <p:cNvPr id="1026" name="Picture 2" descr="https://scontent-yyz1-1.xx.fbcdn.net/hphotos-xpa1/v/t35.0-12/12921993_1063443753717972_382830615_o.png?oh=bb429ab7c89a9f73c044d2b0dd16f290&amp;oe=56FDBFA3"/>
+          <p:cNvPicPr>
+            <a:picLocks noChangeAspect="1" noChangeArrowheads="1"/>
+          </p:cNvPicPr>
+          <p:nvPr/>
+        </p:nvPicPr>
+        <p:blipFill>
+          <a:blip r:embed="rId2">
+            <a:extLst>
+              <a:ext uri="{28A0092B-C50C-407E-A947-70E740481C1C}">
+                <a14:useLocalDpi xmlns:a14="http://schemas.microsoft.com/office/drawing/2010/main" val="0"/>
+              </a:ext>
+            </a:extLst>
+          </a:blip>
+          <a:srcRect/>
+          <a:stretch>
+            <a:fillRect/>
+          </a:stretch>
+        </p:blipFill>
+        <p:spPr bwMode="auto">
+          <a:xfrm>
+            <a:off x="4554647" y="3582015"/>
+            <a:ext cx="3128538" cy="1667333"/>
+          </a:xfrm>
+          <a:prstGeom prst="rect">
+            <a:avLst/>
+          </a:prstGeom>
+          <a:noFill/>
+          <a:extLst>
+            <a:ext uri="{909E8E84-426E-40DD-AFC4-6F175D3DCCD1}">
+              <a14:hiddenFill xmlns:a14="http://schemas.microsoft.com/office/drawing/2010/main">
+                <a:solidFill>
+                  <a:srgbClr val="FFFFFF"/>
+                </a:solidFill>
+              </a14:hiddenFill>
+            </a:ext>
+          </a:extLst>
+        </p:spPr>
+      </p:pic>
+      <p:pic>
+        <p:nvPicPr>
+          <p:cNvPr id="1028" name="Picture 4" descr="https://scontent-yyz1-1.xx.fbcdn.net/hphotos-xpt1/v/t35.0-12/12915098_1063443913717956_1224829904_o.png?oh=733e22ed24c94085f0c2197c10fedaf7&amp;oe=56FDF040"/>
+          <p:cNvPicPr>
+            <a:picLocks noChangeAspect="1" noChangeArrowheads="1"/>
+          </p:cNvPicPr>
+          <p:nvPr/>
+        </p:nvPicPr>
+        <p:blipFill>
+          <a:blip r:embed="rId3">
+            <a:extLst>
+              <a:ext uri="{28A0092B-C50C-407E-A947-70E740481C1C}">
+                <a14:useLocalDpi xmlns:a14="http://schemas.microsoft.com/office/drawing/2010/main" val="0"/>
+              </a:ext>
+            </a:extLst>
+          </a:blip>
+          <a:srcRect/>
+          <a:stretch>
+            <a:fillRect/>
+          </a:stretch>
+        </p:blipFill>
+        <p:spPr bwMode="auto">
+          <a:xfrm>
+            <a:off x="8299294" y="3582015"/>
+            <a:ext cx="3118764" cy="1662124"/>
+          </a:xfrm>
+          <a:prstGeom prst="rect">
+            <a:avLst/>
+          </a:prstGeom>
+          <a:noFill/>
+          <a:extLst>
+            <a:ext uri="{909E8E84-426E-40DD-AFC4-6F175D3DCCD1}">
+              <a14:hiddenFill xmlns:a14="http://schemas.microsoft.com/office/drawing/2010/main">
+                <a:solidFill>
+                  <a:srgbClr val="FFFFFF"/>
+                </a:solidFill>
+              </a14:hiddenFill>
+            </a:ext>
+          </a:extLst>
+        </p:spPr>
+      </p:pic>
+      <p:pic>
+        <p:nvPicPr>
+          <p:cNvPr id="1030" name="Picture 6" descr="https://scontent-yyz1-1.xx.fbcdn.net/hphotos-xft1/v/t35.0-12/12903981_1063444120384602_129263820_o.png?oh=358208b849e6bebfd7ea1c8cecf1be8c&amp;oe=56FE1220"/>
+          <p:cNvPicPr>
+            <a:picLocks noChangeAspect="1" noChangeArrowheads="1"/>
+          </p:cNvPicPr>
+          <p:nvPr/>
+        </p:nvPicPr>
+        <p:blipFill>
+          <a:blip r:embed="rId4">
+            <a:extLst>
+              <a:ext uri="{28A0092B-C50C-407E-A947-70E740481C1C}">
+                <a14:useLocalDpi xmlns:a14="http://schemas.microsoft.com/office/drawing/2010/main" val="0"/>
+              </a:ext>
+            </a:extLst>
+          </a:blip>
+          <a:srcRect/>
+          <a:stretch>
+            <a:fillRect/>
+          </a:stretch>
+        </p:blipFill>
+        <p:spPr bwMode="auto">
+          <a:xfrm>
+            <a:off x="810000" y="3593883"/>
+            <a:ext cx="3128539" cy="1667333"/>
+          </a:xfrm>
+          <a:prstGeom prst="rect">
+            <a:avLst/>
+          </a:prstGeom>
+          <a:noFill/>
+          <a:extLst>
+            <a:ext uri="{909E8E84-426E-40DD-AFC4-6F175D3DCCD1}">
+              <a14:hiddenFill xmlns:a14="http://schemas.microsoft.com/office/drawing/2010/main">
+                <a:solidFill>
+                  <a:srgbClr val="FFFFFF"/>
+                </a:solidFill>
+              </a14:hiddenFill>
+            </a:ext>
+          </a:extLst>
+        </p:spPr>
+      </p:pic>
+      <p:sp>
+        <p:nvSpPr>
+          <p:cNvPr id="4" name="TextBox 3"/>
+          <p:cNvSpPr txBox="1"/>
+          <p:nvPr/>
+        </p:nvSpPr>
+        <p:spPr>
+          <a:xfrm>
+            <a:off x="2112135" y="2987899"/>
+            <a:ext cx="521297" cy="369332"/>
+          </a:xfrm>
+          <a:prstGeom prst="rect">
+            <a:avLst/>
+          </a:prstGeom>
+          <a:noFill/>
+        </p:spPr>
+        <p:txBody>
+          <a:bodyPr wrap="none" rtlCol="0">
+            <a:spAutoFit/>
+          </a:bodyPr>
+          <a:lstStyle/>
+          <a:p>
+            <a:r>
+              <a:rPr lang="hu-HU" dirty="0" smtClean="0"/>
+              <a:t>KŐ</a:t>
+            </a:r>
+            <a:endParaRPr lang="hu-HU" dirty="0"/>
+          </a:p>
+        </p:txBody>
+      </p:sp>
+      <p:sp>
+        <p:nvSpPr>
+          <p:cNvPr id="8" name="TextBox 7"/>
+          <p:cNvSpPr txBox="1"/>
+          <p:nvPr/>
+        </p:nvSpPr>
+        <p:spPr>
+          <a:xfrm>
+            <a:off x="5685469" y="2987899"/>
+            <a:ext cx="821059" cy="369332"/>
+          </a:xfrm>
+          <a:prstGeom prst="rect">
+            <a:avLst/>
+          </a:prstGeom>
+          <a:noFill/>
+        </p:spPr>
+        <p:txBody>
+          <a:bodyPr wrap="none" rtlCol="0">
+            <a:spAutoFit/>
+          </a:bodyPr>
+          <a:lstStyle/>
+          <a:p>
+            <a:r>
+              <a:rPr lang="hu-HU" dirty="0" smtClean="0"/>
+              <a:t>PAPÍR</a:t>
+            </a:r>
+            <a:endParaRPr lang="hu-HU" dirty="0"/>
+          </a:p>
+        </p:txBody>
+      </p:sp>
+      <p:sp>
+        <p:nvSpPr>
+          <p:cNvPr id="9" name="TextBox 8"/>
+          <p:cNvSpPr txBox="1"/>
+          <p:nvPr/>
+        </p:nvSpPr>
+        <p:spPr>
+          <a:xfrm>
+            <a:off x="9458566" y="2987899"/>
+            <a:ext cx="800219" cy="369332"/>
+          </a:xfrm>
+          <a:prstGeom prst="rect">
+            <a:avLst/>
+          </a:prstGeom>
+          <a:noFill/>
+        </p:spPr>
+        <p:txBody>
+          <a:bodyPr wrap="none" rtlCol="0">
+            <a:spAutoFit/>
+          </a:bodyPr>
+          <a:lstStyle/>
+          <a:p>
+            <a:r>
+              <a:rPr lang="hu-HU" dirty="0" smtClean="0"/>
+              <a:t>OLLÓ</a:t>
+            </a:r>
+            <a:endParaRPr lang="hu-HU" dirty="0"/>
+          </a:p>
+        </p:txBody>
+      </p:sp>
+    </p:spTree>
+    <p:extLst>
+      <p:ext uri="{BB962C8B-B14F-4D97-AF65-F5344CB8AC3E}">
+        <p14:creationId xmlns:p14="http://schemas.microsoft.com/office/powerpoint/2010/main" val="2812621685"/>
+      </p:ext>
+    </p:extLst>
+  </p:cSld>
+  <p:clrMapOvr>
+    <a:masterClrMapping/>
+  </p:clrMapOvr>
+  <p:timing>
+    <p:tnLst>
+      <p:par>
+        <p:cTn id="1" dur="indefinite" restart="never" nodeType="tmRoot"/>
+      </p:par>
+    </p:tnLst>
+  </p:timing>
+</p:sld>
+</file>
+
+<file path=ppt/slides/slide11.xml><?xml version="1.0" encoding="utf-8"?>
+<p:sld xmlns:a="http://schemas.openxmlformats.org/drawingml/2006/main" xmlns:r="http://schemas.openxmlformats.org/officeDocument/2006/relationships" xmlns:p="http://schemas.openxmlformats.org/presentationml/2006/main">
+  <p:cSld>
+    <p:spTree>
+      <p:nvGrpSpPr>
+        <p:cNvPr id="1" name=""/>
+        <p:cNvGrpSpPr/>
+        <p:nvPr/>
+      </p:nvGrpSpPr>
+      <p:grpSpPr>
+        <a:xfrm>
+          <a:off x="0" y="0"/>
+          <a:ext cx="0" cy="0"/>
+          <a:chOff x="0" y="0"/>
+          <a:chExt cx="0" cy="0"/>
+        </a:xfrm>
+      </p:grpSpPr>
+      <p:sp>
+        <p:nvSpPr>
+          <p:cNvPr id="2" name="Title 1"/>
+          <p:cNvSpPr>
+            <a:spLocks noGrp="1"/>
+          </p:cNvSpPr>
+          <p:nvPr>
+            <p:ph type="title"/>
+          </p:nvPr>
+        </p:nvSpPr>
+        <p:spPr/>
+        <p:txBody>
+          <a:bodyPr/>
+          <a:lstStyle/>
+          <a:p>
+            <a:r>
               <a:rPr lang="hu-HU" dirty="0" smtClean="0"/>
               <a:t>Idő és pontosság</a:t>
             </a:r>
@@ -5486,19 +5775,7 @@
           <a:p>
             <a:r>
               <a:rPr lang="hu-HU" dirty="0" smtClean="0"/>
-              <a:t>Átlagos futási idő: </a:t>
-            </a:r>
-            <a:r>
-              <a:rPr lang="hu-HU" dirty="0" smtClean="0"/>
-              <a:t>0.78 </a:t>
-            </a:r>
-            <a:r>
-              <a:rPr lang="hu-HU" dirty="0" smtClean="0"/>
-              <a:t>sec (</a:t>
-            </a:r>
-            <a:r>
-              <a:rPr lang="hu-HU" dirty="0" smtClean="0"/>
-              <a:t>0.3 </a:t>
+              <a:t>Átlagos futási idő: 0.78 sec (0.3 </a:t>
             </a:r>
             <a:r>
               <a:rPr lang="hu-HU" dirty="0" err="1" smtClean="0"/>
@@ -5512,15 +5789,7 @@
           <a:p>
             <a:r>
               <a:rPr lang="hu-HU" dirty="0" smtClean="0"/>
-              <a:t>24 </a:t>
-            </a:r>
-            <a:r>
-              <a:rPr lang="hu-HU" smtClean="0"/>
-              <a:t>* </a:t>
-            </a:r>
-            <a:r>
-              <a:rPr lang="hu-HU" smtClean="0"/>
-              <a:t>0.78 sec </a:t>
+              <a:t>24 * 0.78 sec </a:t>
             </a:r>
             <a:r>
               <a:rPr lang="hu-HU" dirty="0" smtClean="0">
@@ -5533,13 +5802,29 @@
           <a:p>
             <a:r>
               <a:rPr lang="hu-HU" dirty="0" smtClean="0"/>
-              <a:t>Pontosság: elütő háttérrel &amp; jó fényviszonnyal: 80 %</a:t>
-            </a:r>
-          </a:p>
-          <a:p>
+              <a:t>Pontosság: elütő háttérrel &amp; jó fényviszonnyal: </a:t>
+            </a:r>
             <a:r>
               <a:rPr lang="hu-HU" dirty="0" smtClean="0"/>
-              <a:t>Pontosság: rosszabb fényviszonnyal: 60-70 %</a:t>
+              <a:t>70-80 </a:t>
+            </a:r>
+            <a:r>
+              <a:rPr lang="hu-HU" dirty="0" smtClean="0"/>
+              <a:t>%</a:t>
+            </a:r>
+          </a:p>
+          <a:p>
+            <a:r>
+              <a:rPr lang="hu-HU" dirty="0" smtClean="0"/>
+              <a:t>Pontosság: rosszabb fényviszonnyal: </a:t>
+            </a:r>
+            <a:r>
+              <a:rPr lang="hu-HU" dirty="0" smtClean="0"/>
+              <a:t>50-60 </a:t>
+            </a:r>
+            <a:r>
+              <a:rPr lang="hu-HU" dirty="0" smtClean="0"/>
+              <a:t>%</a:t>
             </a:r>
           </a:p>
           <a:p>
@@ -5868,7 +6153,7 @@
 </p:sld>
 </file>
 
-<file path=ppt/slides/slide11.xml><?xml version="1.0" encoding="utf-8"?>
+<file path=ppt/slides/slide12.xml><?xml version="1.0" encoding="utf-8"?>
 <p:sld xmlns:a="http://schemas.openxmlformats.org/drawingml/2006/main" xmlns:r="http://schemas.openxmlformats.org/officeDocument/2006/relationships" xmlns:p="http://schemas.openxmlformats.org/presentationml/2006/main">
   <p:cSld>
     <p:spTree>
@@ -5988,6 +6273,131 @@
 </file>
 
 <file path=ppt/slides/slide2.xml><?xml version="1.0" encoding="utf-8"?>
+<p:sld xmlns:a="http://schemas.openxmlformats.org/drawingml/2006/main" xmlns:r="http://schemas.openxmlformats.org/officeDocument/2006/relationships" xmlns:p="http://schemas.openxmlformats.org/presentationml/2006/main">
+  <p:cSld>
+    <p:spTree>
+      <p:nvGrpSpPr>
+        <p:cNvPr id="1" name=""/>
+        <p:cNvGrpSpPr/>
+        <p:nvPr/>
+      </p:nvGrpSpPr>
+      <p:grpSpPr>
+        <a:xfrm>
+          <a:off x="0" y="0"/>
+          <a:ext cx="0" cy="0"/>
+          <a:chOff x="0" y="0"/>
+          <a:chExt cx="0" cy="0"/>
+        </a:xfrm>
+      </p:grpSpPr>
+      <p:sp>
+        <p:nvSpPr>
+          <p:cNvPr id="2" name="Title 1"/>
+          <p:cNvSpPr>
+            <a:spLocks noGrp="1"/>
+          </p:cNvSpPr>
+          <p:nvPr>
+            <p:ph type="title"/>
+          </p:nvPr>
+        </p:nvSpPr>
+        <p:spPr/>
+        <p:txBody>
+          <a:bodyPr/>
+          <a:lstStyle/>
+          <a:p>
+            <a:r>
+              <a:rPr lang="en-US" dirty="0" smtClean="0"/>
+              <a:t>IKM6</a:t>
+            </a:r>
+            <a:r>
+              <a:rPr lang="hu-HU" dirty="0" smtClean="0"/>
+              <a:t> csapat</a:t>
+            </a:r>
+            <a:endParaRPr lang="hu-HU" dirty="0"/>
+          </a:p>
+        </p:txBody>
+      </p:sp>
+      <p:sp>
+        <p:nvSpPr>
+          <p:cNvPr id="3" name="Content Placeholder 2"/>
+          <p:cNvSpPr>
+            <a:spLocks noGrp="1"/>
+          </p:cNvSpPr>
+          <p:nvPr>
+            <p:ph idx="1"/>
+          </p:nvPr>
+        </p:nvSpPr>
+        <p:spPr/>
+        <p:txBody>
+          <a:bodyPr>
+            <a:normAutofit/>
+          </a:bodyPr>
+          <a:lstStyle/>
+          <a:p>
+            <a:r>
+              <a:rPr lang="en-US" sz="2400" dirty="0" err="1" smtClean="0"/>
+              <a:t>Csapattagok</a:t>
+            </a:r>
+            <a:r>
+              <a:rPr lang="hu-HU" sz="2400" dirty="0" smtClean="0"/>
+              <a:t>:</a:t>
+            </a:r>
+          </a:p>
+          <a:p>
+            <a:pPr lvl="1"/>
+            <a:r>
+              <a:rPr lang="hu-HU" sz="2000" dirty="0" smtClean="0"/>
+              <a:t>Horváth Gergely</a:t>
+            </a:r>
+          </a:p>
+          <a:p>
+            <a:pPr lvl="1"/>
+            <a:r>
+              <a:rPr lang="hu-HU" sz="2000" dirty="0" smtClean="0"/>
+              <a:t>Mihályi Balázs</a:t>
+            </a:r>
+          </a:p>
+          <a:p>
+            <a:pPr lvl="1"/>
+            <a:r>
+              <a:rPr lang="hu-HU" sz="2000" dirty="0" err="1" smtClean="0"/>
+              <a:t>Münczberg</a:t>
+            </a:r>
+            <a:r>
+              <a:rPr lang="hu-HU" sz="2000" dirty="0" smtClean="0"/>
+              <a:t> Tamás</a:t>
+            </a:r>
+          </a:p>
+          <a:p>
+            <a:pPr lvl="1"/>
+            <a:r>
+              <a:rPr lang="hu-HU" sz="2000" dirty="0" smtClean="0"/>
+              <a:t>Vecsei Gábor</a:t>
+            </a:r>
+            <a:endParaRPr lang="hu-HU" sz="2000" dirty="0"/>
+          </a:p>
+        </p:txBody>
+      </p:sp>
+    </p:spTree>
+    <p:extLst>
+      <p:ext uri="{BB962C8B-B14F-4D97-AF65-F5344CB8AC3E}">
+        <p14:creationId xmlns:p14="http://schemas.microsoft.com/office/powerpoint/2010/main" val="2038141260"/>
+      </p:ext>
+    </p:extLst>
+  </p:cSld>
+  <p:clrMapOvr>
+    <a:masterClrMapping/>
+  </p:clrMapOvr>
+  <p:timing>
+    <p:tnLst>
+      <p:par>
+        <p:cTn id="1" dur="indefinite" restart="never" nodeType="tmRoot"/>
+      </p:par>
+    </p:tnLst>
+  </p:timing>
+</p:sld>
+</file>
+
+<file path=ppt/slides/slide3.xml><?xml version="1.0" encoding="utf-8"?>
 <p:sld xmlns:a="http://schemas.openxmlformats.org/drawingml/2006/main" xmlns:r="http://schemas.openxmlformats.org/officeDocument/2006/relationships" xmlns:p="http://schemas.openxmlformats.org/presentationml/2006/main">
   <p:cSld>
     <p:spTree>
@@ -6505,7 +6915,7 @@
 </p:sld>
 </file>
 
-<file path=ppt/slides/slide3.xml><?xml version="1.0" encoding="utf-8"?>
+<file path=ppt/slides/slide4.xml><?xml version="1.0" encoding="utf-8"?>
 <p:sld xmlns:a="http://schemas.openxmlformats.org/drawingml/2006/main" xmlns:r="http://schemas.openxmlformats.org/officeDocument/2006/relationships" xmlns:p="http://schemas.openxmlformats.org/presentationml/2006/main">
   <p:cSld>
     <p:spTree>
@@ -6618,13 +7028,16 @@
             </a:r>
             <a:r>
               <a:rPr lang="hu-HU" dirty="0"/>
-              <a:t>kék fényerejének </a:t>
+              <a:t>kék </a:t>
+            </a:r>
+            <a:r>
+              <a:rPr lang="hu-HU" dirty="0" smtClean="0"/>
+              <a:t>komponens </a:t>
             </a:r>
             <a:r>
               <a:rPr lang="hu-HU" dirty="0" smtClean="0"/>
               <a:t>eltérése egy referencia értéktől</a:t>
             </a:r>
-            <a:endParaRPr lang="hu-HU" dirty="0" smtClean="0"/>
           </a:p>
           <a:p>
             <a:pPr lvl="1"/>
@@ -6638,18 +7051,42 @@
             </a:r>
             <a:r>
               <a:rPr lang="hu-HU" dirty="0"/>
-              <a:t>vörös fényerejének </a:t>
+              <a:t>vörös </a:t>
             </a:r>
             <a:r>
               <a:rPr lang="hu-HU" dirty="0" smtClean="0"/>
-              <a:t>eltérése egy referencia értéktől</a:t>
+              <a:t>komponens eltérése </a:t>
+            </a:r>
+            <a:r>
+              <a:rPr lang="hu-HU" dirty="0" smtClean="0"/>
+              <a:t>egy referencia értéktől</a:t>
             </a:r>
           </a:p>
           <a:p>
             <a:pPr lvl="1"/>
             <a:r>
+              <a:rPr lang="hu-HU" dirty="0" err="1"/>
+              <a:t>Chai</a:t>
+            </a:r>
+            <a:r>
+              <a:rPr lang="hu-HU" dirty="0"/>
+              <a:t> and </a:t>
+            </a:r>
+            <a:r>
+              <a:rPr lang="hu-HU" dirty="0" err="1" smtClean="0"/>
+              <a:t>Ngan</a:t>
+            </a:r>
+            <a:r>
+              <a:rPr lang="hu-HU" dirty="0" smtClean="0"/>
+              <a:t>: </a:t>
+            </a:r>
+            <a:r>
+              <a:rPr lang="en-US" dirty="0" smtClean="0"/>
+              <a:t>77</a:t>
+            </a:r>
+            <a:r>
               <a:rPr lang="en-US" dirty="0"/>
-              <a:t>77≤</a:t>
+              <a:t>≤</a:t>
             </a:r>
             <a:r>
               <a:rPr lang="en-US" i="1" dirty="0"/>
@@ -7332,7 +7769,7 @@
 </p:sld>
 </file>
 
-<file path=ppt/slides/slide4.xml><?xml version="1.0" encoding="utf-8"?>
+<file path=ppt/slides/slide5.xml><?xml version="1.0" encoding="utf-8"?>
 <p:sld xmlns:a="http://schemas.openxmlformats.org/drawingml/2006/main" xmlns:r="http://schemas.openxmlformats.org/officeDocument/2006/relationships" xmlns:p="http://schemas.openxmlformats.org/presentationml/2006/main">
   <p:cSld>
     <p:spTree>
@@ -7446,7 +7883,7 @@
 </p:sld>
 </file>
 
-<file path=ppt/slides/slide5.xml><?xml version="1.0" encoding="utf-8"?>
+<file path=ppt/slides/slide6.xml><?xml version="1.0" encoding="utf-8"?>
 <p:sld xmlns:a="http://schemas.openxmlformats.org/drawingml/2006/main" xmlns:r="http://schemas.openxmlformats.org/officeDocument/2006/relationships" xmlns:p="http://schemas.openxmlformats.org/presentationml/2006/main">
   <p:cSld>
     <p:spTree>
@@ -7879,7 +8316,7 @@
 </p:sld>
 </file>
 
-<file path=ppt/slides/slide6.xml><?xml version="1.0" encoding="utf-8"?>
+<file path=ppt/slides/slide7.xml><?xml version="1.0" encoding="utf-8"?>
 <p:sld xmlns:a="http://schemas.openxmlformats.org/drawingml/2006/main" xmlns:r="http://schemas.openxmlformats.org/officeDocument/2006/relationships" xmlns:p="http://schemas.openxmlformats.org/presentationml/2006/main">
   <p:cSld>
     <p:spTree>
@@ -7938,11 +8375,7 @@
           <a:p>
             <a:r>
               <a:rPr lang="hu-HU" sz="2400" b="1" dirty="0" smtClean="0"/>
-              <a:t>A </a:t>
-            </a:r>
-            <a:r>
-              <a:rPr lang="hu-HU" sz="2400" b="1" dirty="0" smtClean="0"/>
-              <a:t>kiemelés</a:t>
+              <a:t>A kiemelés</a:t>
             </a:r>
             <a:endParaRPr lang="hu-HU" sz="1800" dirty="0" smtClean="0"/>
           </a:p>
@@ -7965,11 +8398,7 @@
             </a:r>
             <a:r>
               <a:rPr lang="hu-HU" sz="1800" dirty="0" smtClean="0"/>
-              <a:t> </a:t>
-            </a:r>
-            <a:r>
-              <a:rPr lang="hu-HU" sz="1800" dirty="0" smtClean="0"/>
-              <a:t>– Tenyér visszaállítása</a:t>
+              <a:t> – Tenyér visszaállítása</a:t>
             </a:r>
           </a:p>
           <a:p>
@@ -8331,7 +8760,7 @@
 </p:sld>
 </file>
 
-<file path=ppt/slides/slide7.xml><?xml version="1.0" encoding="utf-8"?>
+<file path=ppt/slides/slide8.xml><?xml version="1.0" encoding="utf-8"?>
 <p:sld xmlns:a="http://schemas.openxmlformats.org/drawingml/2006/main" xmlns:r="http://schemas.openxmlformats.org/officeDocument/2006/relationships" xmlns:p="http://schemas.openxmlformats.org/presentationml/2006/main">
   <p:cSld>
     <p:spTree>
@@ -8415,7 +8844,7 @@
 </p:sld>
 </file>
 
-<file path=ppt/slides/slide8.xml><?xml version="1.0" encoding="utf-8"?>
+<file path=ppt/slides/slide9.xml><?xml version="1.0" encoding="utf-8"?>
 <p:sld xmlns:a="http://schemas.openxmlformats.org/drawingml/2006/main" xmlns:r="http://schemas.openxmlformats.org/officeDocument/2006/relationships" xmlns:p="http://schemas.openxmlformats.org/presentationml/2006/main">
   <p:cSld>
     <p:spTree>
@@ -8965,278 +9394,6 @@
 </p:sld>
 </file>
 
-<file path=ppt/slides/slide9.xml><?xml version="1.0" encoding="utf-8"?>
-<p:sld xmlns:a="http://schemas.openxmlformats.org/drawingml/2006/main" xmlns:r="http://schemas.openxmlformats.org/officeDocument/2006/relationships" xmlns:p="http://schemas.openxmlformats.org/presentationml/2006/main">
-  <p:cSld>
-    <p:spTree>
-      <p:nvGrpSpPr>
-        <p:cNvPr id="1" name=""/>
-        <p:cNvGrpSpPr/>
-        <p:nvPr/>
-      </p:nvGrpSpPr>
-      <p:grpSpPr>
-        <a:xfrm>
-          <a:off x="0" y="0"/>
-          <a:ext cx="0" cy="0"/>
-          <a:chOff x="0" y="0"/>
-          <a:chExt cx="0" cy="0"/>
-        </a:xfrm>
-      </p:grpSpPr>
-      <p:sp>
-        <p:nvSpPr>
-          <p:cNvPr id="2" name="Title 1"/>
-          <p:cNvSpPr>
-            <a:spLocks noGrp="1"/>
-          </p:cNvSpPr>
-          <p:nvPr>
-            <p:ph type="title"/>
-          </p:nvPr>
-        </p:nvSpPr>
-        <p:spPr/>
-        <p:txBody>
-          <a:bodyPr/>
-          <a:lstStyle/>
-          <a:p>
-            <a:r>
-              <a:rPr lang="hu-HU" dirty="0"/>
-              <a:t>Ujjak felismerése</a:t>
-            </a:r>
-          </a:p>
-        </p:txBody>
-      </p:sp>
-      <p:pic>
-        <p:nvPicPr>
-          <p:cNvPr id="1026" name="Picture 2" descr="https://scontent-yyz1-1.xx.fbcdn.net/hphotos-xpa1/v/t35.0-12/12921993_1063443753717972_382830615_o.png?oh=bb429ab7c89a9f73c044d2b0dd16f290&amp;oe=56FDBFA3"/>
-          <p:cNvPicPr>
-            <a:picLocks noChangeAspect="1" noChangeArrowheads="1"/>
-          </p:cNvPicPr>
-          <p:nvPr/>
-        </p:nvPicPr>
-        <p:blipFill>
-          <a:blip r:embed="rId2">
-            <a:extLst>
-              <a:ext uri="{28A0092B-C50C-407E-A947-70E740481C1C}">
-                <a14:useLocalDpi xmlns:a14="http://schemas.microsoft.com/office/drawing/2010/main" val="0"/>
-              </a:ext>
-            </a:extLst>
-          </a:blip>
-          <a:srcRect/>
-          <a:stretch>
-            <a:fillRect/>
-          </a:stretch>
-        </p:blipFill>
-        <p:spPr bwMode="auto">
-          <a:xfrm>
-            <a:off x="4554647" y="3582015"/>
-            <a:ext cx="3128538" cy="1667333"/>
-          </a:xfrm>
-          <a:prstGeom prst="rect">
-            <a:avLst/>
-          </a:prstGeom>
-          <a:noFill/>
-          <a:extLst>
-            <a:ext uri="{909E8E84-426E-40DD-AFC4-6F175D3DCCD1}">
-              <a14:hiddenFill xmlns:a14="http://schemas.microsoft.com/office/drawing/2010/main">
-                <a:solidFill>
-                  <a:srgbClr val="FFFFFF"/>
-                </a:solidFill>
-              </a14:hiddenFill>
-            </a:ext>
-          </a:extLst>
-        </p:spPr>
-      </p:pic>
-      <p:pic>
-        <p:nvPicPr>
-          <p:cNvPr id="1028" name="Picture 4" descr="https://scontent-yyz1-1.xx.fbcdn.net/hphotos-xpt1/v/t35.0-12/12915098_1063443913717956_1224829904_o.png?oh=733e22ed24c94085f0c2197c10fedaf7&amp;oe=56FDF040"/>
-          <p:cNvPicPr>
-            <a:picLocks noChangeAspect="1" noChangeArrowheads="1"/>
-          </p:cNvPicPr>
-          <p:nvPr/>
-        </p:nvPicPr>
-        <p:blipFill>
-          <a:blip r:embed="rId3">
-            <a:extLst>
-              <a:ext uri="{28A0092B-C50C-407E-A947-70E740481C1C}">
-                <a14:useLocalDpi xmlns:a14="http://schemas.microsoft.com/office/drawing/2010/main" val="0"/>
-              </a:ext>
-            </a:extLst>
-          </a:blip>
-          <a:srcRect/>
-          <a:stretch>
-            <a:fillRect/>
-          </a:stretch>
-        </p:blipFill>
-        <p:spPr bwMode="auto">
-          <a:xfrm>
-            <a:off x="8299294" y="3582015"/>
-            <a:ext cx="3118764" cy="1662124"/>
-          </a:xfrm>
-          <a:prstGeom prst="rect">
-            <a:avLst/>
-          </a:prstGeom>
-          <a:noFill/>
-          <a:extLst>
-            <a:ext uri="{909E8E84-426E-40DD-AFC4-6F175D3DCCD1}">
-              <a14:hiddenFill xmlns:a14="http://schemas.microsoft.com/office/drawing/2010/main">
-                <a:solidFill>
-                  <a:srgbClr val="FFFFFF"/>
-                </a:solidFill>
-              </a14:hiddenFill>
-            </a:ext>
-          </a:extLst>
-        </p:spPr>
-      </p:pic>
-      <p:pic>
-        <p:nvPicPr>
-          <p:cNvPr id="1030" name="Picture 6" descr="https://scontent-yyz1-1.xx.fbcdn.net/hphotos-xft1/v/t35.0-12/12903981_1063444120384602_129263820_o.png?oh=358208b849e6bebfd7ea1c8cecf1be8c&amp;oe=56FE1220"/>
-          <p:cNvPicPr>
-            <a:picLocks noChangeAspect="1" noChangeArrowheads="1"/>
-          </p:cNvPicPr>
-          <p:nvPr/>
-        </p:nvPicPr>
-        <p:blipFill>
-          <a:blip r:embed="rId4">
-            <a:extLst>
-              <a:ext uri="{28A0092B-C50C-407E-A947-70E740481C1C}">
-                <a14:useLocalDpi xmlns:a14="http://schemas.microsoft.com/office/drawing/2010/main" val="0"/>
-              </a:ext>
-            </a:extLst>
-          </a:blip>
-          <a:srcRect/>
-          <a:stretch>
-            <a:fillRect/>
-          </a:stretch>
-        </p:blipFill>
-        <p:spPr bwMode="auto">
-          <a:xfrm>
-            <a:off x="810000" y="3593883"/>
-            <a:ext cx="3128539" cy="1667333"/>
-          </a:xfrm>
-          <a:prstGeom prst="rect">
-            <a:avLst/>
-          </a:prstGeom>
-          <a:noFill/>
-          <a:extLst>
-            <a:ext uri="{909E8E84-426E-40DD-AFC4-6F175D3DCCD1}">
-              <a14:hiddenFill xmlns:a14="http://schemas.microsoft.com/office/drawing/2010/main">
-                <a:solidFill>
-                  <a:srgbClr val="FFFFFF"/>
-                </a:solidFill>
-              </a14:hiddenFill>
-            </a:ext>
-          </a:extLst>
-        </p:spPr>
-      </p:pic>
-      <p:sp>
-        <p:nvSpPr>
-          <p:cNvPr id="4" name="TextBox 3"/>
-          <p:cNvSpPr txBox="1"/>
-          <p:nvPr/>
-        </p:nvSpPr>
-        <p:spPr>
-          <a:xfrm>
-            <a:off x="2112135" y="2987899"/>
-            <a:ext cx="521297" cy="369332"/>
-          </a:xfrm>
-          <a:prstGeom prst="rect">
-            <a:avLst/>
-          </a:prstGeom>
-          <a:noFill/>
-        </p:spPr>
-        <p:txBody>
-          <a:bodyPr wrap="none" rtlCol="0">
-            <a:spAutoFit/>
-          </a:bodyPr>
-          <a:lstStyle/>
-          <a:p>
-            <a:r>
-              <a:rPr lang="hu-HU" dirty="0" smtClean="0"/>
-              <a:t>KŐ</a:t>
-            </a:r>
-            <a:endParaRPr lang="hu-HU" dirty="0"/>
-          </a:p>
-        </p:txBody>
-      </p:sp>
-      <p:sp>
-        <p:nvSpPr>
-          <p:cNvPr id="8" name="TextBox 7"/>
-          <p:cNvSpPr txBox="1"/>
-          <p:nvPr/>
-        </p:nvSpPr>
-        <p:spPr>
-          <a:xfrm>
-            <a:off x="5685469" y="2987899"/>
-            <a:ext cx="821059" cy="369332"/>
-          </a:xfrm>
-          <a:prstGeom prst="rect">
-            <a:avLst/>
-          </a:prstGeom>
-          <a:noFill/>
-        </p:spPr>
-        <p:txBody>
-          <a:bodyPr wrap="none" rtlCol="0">
-            <a:spAutoFit/>
-          </a:bodyPr>
-          <a:lstStyle/>
-          <a:p>
-            <a:r>
-              <a:rPr lang="hu-HU" dirty="0" smtClean="0"/>
-              <a:t>PAPÍR</a:t>
-            </a:r>
-            <a:endParaRPr lang="hu-HU" dirty="0"/>
-          </a:p>
-        </p:txBody>
-      </p:sp>
-      <p:sp>
-        <p:nvSpPr>
-          <p:cNvPr id="9" name="TextBox 8"/>
-          <p:cNvSpPr txBox="1"/>
-          <p:nvPr/>
-        </p:nvSpPr>
-        <p:spPr>
-          <a:xfrm>
-            <a:off x="9458566" y="2987899"/>
-            <a:ext cx="800219" cy="369332"/>
-          </a:xfrm>
-          <a:prstGeom prst="rect">
-            <a:avLst/>
-          </a:prstGeom>
-          <a:noFill/>
-        </p:spPr>
-        <p:txBody>
-          <a:bodyPr wrap="none" rtlCol="0">
-            <a:spAutoFit/>
-          </a:bodyPr>
-          <a:lstStyle/>
-          <a:p>
-            <a:r>
-              <a:rPr lang="hu-HU" dirty="0" smtClean="0"/>
-              <a:t>OLLÓ</a:t>
-            </a:r>
-            <a:endParaRPr lang="hu-HU" dirty="0"/>
-          </a:p>
-        </p:txBody>
-      </p:sp>
-    </p:spTree>
-    <p:extLst>
-      <p:ext uri="{BB962C8B-B14F-4D97-AF65-F5344CB8AC3E}">
-        <p14:creationId xmlns:p14="http://schemas.microsoft.com/office/powerpoint/2010/main" val="2812621685"/>
-      </p:ext>
-    </p:extLst>
-  </p:cSld>
-  <p:clrMapOvr>
-    <a:masterClrMapping/>
-  </p:clrMapOvr>
-  <p:timing>
-    <p:tnLst>
-      <p:par>
-        <p:cTn id="1" dur="indefinite" restart="never" nodeType="tmRoot"/>
-      </p:par>
-    </p:tnLst>
-  </p:timing>
-</p:sld>
-</file>
-
 <file path=ppt/theme/theme1.xml><?xml version="1.0" encoding="utf-8"?>
 <a:theme xmlns:a="http://schemas.openxmlformats.org/drawingml/2006/main" name="Quotable">
   <a:themeElements>

</xml_diff>